<commit_message>
Small update to lexical analysis stuff
</commit_message>
<xml_diff>
--- a/C2-LexicalAnalysis.pptx
+++ b/C2-LexicalAnalysis.pptx
@@ -226,7 +226,7 @@
           <a:p>
             <a:fld id="{ED84AEFD-38B8-C345-A787-4D64BF525EF9}" type="datetimeFigureOut">
               <a:rPr lang="en-US" smtClean="0"/>
-              <a:t>3/22/20</a:t>
+              <a:t>8/28/20</a:t>
             </a:fld>
             <a:endParaRPr lang="en-US"/>
           </a:p>
@@ -640,7 +640,7 @@
           <a:p>
             <a:fld id="{0B6210C0-DE89-DA42-A6DB-BD29A74278E9}" type="datetime1">
               <a:rPr lang="en-US" smtClean="0"/>
-              <a:t>3/22/20</a:t>
+              <a:t>8/28/20</a:t>
             </a:fld>
             <a:endParaRPr lang="en-US"/>
           </a:p>
@@ -841,7 +841,7 @@
           <a:p>
             <a:fld id="{6EC551EC-51FA-6748-A3F1-589B90B7664C}" type="datetime1">
               <a:rPr lang="en-US" smtClean="0"/>
-              <a:t>3/22/20</a:t>
+              <a:t>8/28/20</a:t>
             </a:fld>
             <a:endParaRPr lang="en-US"/>
           </a:p>
@@ -1052,7 +1052,7 @@
           <a:p>
             <a:fld id="{102ADA6E-8082-8C41-9E78-F4B26B393298}" type="datetime1">
               <a:rPr lang="en-US" smtClean="0"/>
-              <a:t>3/22/20</a:t>
+              <a:t>8/28/20</a:t>
             </a:fld>
             <a:endParaRPr lang="en-US"/>
           </a:p>
@@ -1253,7 +1253,7 @@
           <a:p>
             <a:fld id="{109BF26D-6490-C64E-AF1E-CC03DDA9C9F7}" type="datetime1">
               <a:rPr lang="en-US" smtClean="0"/>
-              <a:t>3/22/20</a:t>
+              <a:t>8/28/20</a:t>
             </a:fld>
             <a:endParaRPr lang="en-US"/>
           </a:p>
@@ -1531,7 +1531,7 @@
           <a:p>
             <a:fld id="{E2CFEEE7-9BA1-8A4A-85A5-FE65CDC3854C}" type="datetime1">
               <a:rPr lang="en-US" smtClean="0"/>
-              <a:t>3/22/20</a:t>
+              <a:t>8/28/20</a:t>
             </a:fld>
             <a:endParaRPr lang="en-US"/>
           </a:p>
@@ -1799,7 +1799,7 @@
           <a:p>
             <a:fld id="{27F94AA3-58B9-AE42-B0D1-A84E7AA36DAE}" type="datetime1">
               <a:rPr lang="en-US" smtClean="0"/>
-              <a:t>3/22/20</a:t>
+              <a:t>8/28/20</a:t>
             </a:fld>
             <a:endParaRPr lang="en-US"/>
           </a:p>
@@ -2214,7 +2214,7 @@
           <a:p>
             <a:fld id="{A11418AA-DCFC-CE45-9E12-B24AF1B02252}" type="datetime1">
               <a:rPr lang="en-US" smtClean="0"/>
-              <a:t>3/22/20</a:t>
+              <a:t>8/28/20</a:t>
             </a:fld>
             <a:endParaRPr lang="en-US"/>
           </a:p>
@@ -2358,7 +2358,7 @@
           <a:p>
             <a:fld id="{CA59F37E-8B99-554B-8BCC-D95F12E1339B}" type="datetime1">
               <a:rPr lang="en-US" smtClean="0"/>
-              <a:t>3/22/20</a:t>
+              <a:t>8/28/20</a:t>
             </a:fld>
             <a:endParaRPr lang="en-US"/>
           </a:p>
@@ -2474,7 +2474,7 @@
           <a:p>
             <a:fld id="{DE7A07C1-84B4-D048-945D-866E5165F3FC}" type="datetime1">
               <a:rPr lang="en-US" smtClean="0"/>
-              <a:t>3/22/20</a:t>
+              <a:t>8/28/20</a:t>
             </a:fld>
             <a:endParaRPr lang="en-US"/>
           </a:p>
@@ -2788,7 +2788,7 @@
           <a:p>
             <a:fld id="{E66A824E-467E-B043-AD51-415073F8297E}" type="datetime1">
               <a:rPr lang="en-US" smtClean="0"/>
-              <a:t>3/22/20</a:t>
+              <a:t>8/28/20</a:t>
             </a:fld>
             <a:endParaRPr lang="en-US"/>
           </a:p>
@@ -3079,7 +3079,7 @@
           <a:p>
             <a:fld id="{9C55CC19-38D7-1D48-8C70-BAE869026916}" type="datetime1">
               <a:rPr lang="en-US" smtClean="0"/>
-              <a:t>3/22/20</a:t>
+              <a:t>8/28/20</a:t>
             </a:fld>
             <a:endParaRPr lang="en-US"/>
           </a:p>
@@ -3323,7 +3323,7 @@
           <a:p>
             <a:fld id="{0DD77EDE-9B12-2148-8221-D0CC4FD22588}" type="datetime1">
               <a:rPr lang="en-US" smtClean="0"/>
-              <a:t>3/22/20</a:t>
+              <a:t>8/28/20</a:t>
             </a:fld>
             <a:endParaRPr lang="en-US"/>
           </a:p>
@@ -3765,6 +3765,13 @@
           <a:bodyPr/>
           <a:lstStyle/>
           <a:p>
+            <a:r>
+              <a:rPr lang="en-US" dirty="0"/>
+              <a:t>Part 3</a:t>
+            </a:r>
+            <a:br>
+              <a:rPr lang="en-US" dirty="0"/>
+            </a:br>
             <a:r>
               <a:rPr lang="en-US" dirty="0"/>
               <a:t>Lexical Analysis</a:t>
@@ -24739,7 +24746,7 @@
           <a:p>
             <a:r>
               <a:rPr lang="en-US" dirty="0"/>
-              <a:t>Minimize States in DFA</a:t>
+              <a:t>Minimize States in DFA (We will not cover this)</a:t>
             </a:r>
           </a:p>
         </p:txBody>

</xml_diff>